<commit_message>
Added redact option to mitigators and changed "processing" terminology to "estimator".
</commit_message>
<xml_diff>
--- a/talks/fairness_patterns.pptx
+++ b/talks/fairness_patterns.pptx
@@ -259,7 +259,7 @@
           <a:p>
             <a:fld id="{9DC5AB9B-0FFF-401A-9D33-706977E99E8B}" type="datetimeFigureOut">
               <a:rPr lang="en-US" smtClean="0"/>
-              <a:t>12/29/2020</a:t>
+              <a:t>2/8/2021</a:t>
             </a:fld>
             <a:endParaRPr lang="en-US"/>
           </a:p>
@@ -457,7 +457,7 @@
           <a:p>
             <a:fld id="{9DC5AB9B-0FFF-401A-9D33-706977E99E8B}" type="datetimeFigureOut">
               <a:rPr lang="en-US" smtClean="0"/>
-              <a:t>12/29/2020</a:t>
+              <a:t>2/8/2021</a:t>
             </a:fld>
             <a:endParaRPr lang="en-US"/>
           </a:p>
@@ -665,7 +665,7 @@
           <a:p>
             <a:fld id="{9DC5AB9B-0FFF-401A-9D33-706977E99E8B}" type="datetimeFigureOut">
               <a:rPr lang="en-US" smtClean="0"/>
-              <a:t>12/29/2020</a:t>
+              <a:t>2/8/2021</a:t>
             </a:fld>
             <a:endParaRPr lang="en-US"/>
           </a:p>
@@ -863,7 +863,7 @@
           <a:p>
             <a:fld id="{9DC5AB9B-0FFF-401A-9D33-706977E99E8B}" type="datetimeFigureOut">
               <a:rPr lang="en-US" smtClean="0"/>
-              <a:t>12/29/2020</a:t>
+              <a:t>2/8/2021</a:t>
             </a:fld>
             <a:endParaRPr lang="en-US"/>
           </a:p>
@@ -1138,7 +1138,7 @@
           <a:p>
             <a:fld id="{9DC5AB9B-0FFF-401A-9D33-706977E99E8B}" type="datetimeFigureOut">
               <a:rPr lang="en-US" smtClean="0"/>
-              <a:t>12/29/2020</a:t>
+              <a:t>2/8/2021</a:t>
             </a:fld>
             <a:endParaRPr lang="en-US"/>
           </a:p>
@@ -1403,7 +1403,7 @@
           <a:p>
             <a:fld id="{9DC5AB9B-0FFF-401A-9D33-706977E99E8B}" type="datetimeFigureOut">
               <a:rPr lang="en-US" smtClean="0"/>
-              <a:t>12/29/2020</a:t>
+              <a:t>2/8/2021</a:t>
             </a:fld>
             <a:endParaRPr lang="en-US"/>
           </a:p>
@@ -1815,7 +1815,7 @@
           <a:p>
             <a:fld id="{9DC5AB9B-0FFF-401A-9D33-706977E99E8B}" type="datetimeFigureOut">
               <a:rPr lang="en-US" smtClean="0"/>
-              <a:t>12/29/2020</a:t>
+              <a:t>2/8/2021</a:t>
             </a:fld>
             <a:endParaRPr lang="en-US"/>
           </a:p>
@@ -1956,7 +1956,7 @@
           <a:p>
             <a:fld id="{9DC5AB9B-0FFF-401A-9D33-706977E99E8B}" type="datetimeFigureOut">
               <a:rPr lang="en-US" smtClean="0"/>
-              <a:t>12/29/2020</a:t>
+              <a:t>2/8/2021</a:t>
             </a:fld>
             <a:endParaRPr lang="en-US"/>
           </a:p>
@@ -2069,7 +2069,7 @@
           <a:p>
             <a:fld id="{9DC5AB9B-0FFF-401A-9D33-706977E99E8B}" type="datetimeFigureOut">
               <a:rPr lang="en-US" smtClean="0"/>
-              <a:t>12/29/2020</a:t>
+              <a:t>2/8/2021</a:t>
             </a:fld>
             <a:endParaRPr lang="en-US"/>
           </a:p>
@@ -2380,7 +2380,7 @@
           <a:p>
             <a:fld id="{9DC5AB9B-0FFF-401A-9D33-706977E99E8B}" type="datetimeFigureOut">
               <a:rPr lang="en-US" smtClean="0"/>
-              <a:t>12/29/2020</a:t>
+              <a:t>2/8/2021</a:t>
             </a:fld>
             <a:endParaRPr lang="en-US"/>
           </a:p>
@@ -2668,7 +2668,7 @@
           <a:p>
             <a:fld id="{9DC5AB9B-0FFF-401A-9D33-706977E99E8B}" type="datetimeFigureOut">
               <a:rPr lang="en-US" smtClean="0"/>
-              <a:t>12/29/2020</a:t>
+              <a:t>2/8/2021</a:t>
             </a:fld>
             <a:endParaRPr lang="en-US"/>
           </a:p>
@@ -2909,7 +2909,7 @@
           <a:p>
             <a:fld id="{9DC5AB9B-0FFF-401A-9D33-706977E99E8B}" type="datetimeFigureOut">
               <a:rPr lang="en-US" smtClean="0"/>
-              <a:t>12/29/2020</a:t>
+              <a:t>2/8/2021</a:t>
             </a:fld>
             <a:endParaRPr lang="en-US"/>
           </a:p>
@@ -3685,7 +3685,7 @@
                 </a:solidFill>
                 <a:latin typeface="Times New Roman" panose="02020603050405020304" pitchFamily="18" charset="0"/>
               </a:rPr>
-              <a:t>preprocessing</a:t>
+              <a:t>pre-estimator mitigation</a:t>
             </a:r>
           </a:p>
         </p:txBody>
@@ -4290,7 +4290,7 @@
                 </a:solidFill>
                 <a:latin typeface="Times New Roman" panose="02020603050405020304" pitchFamily="18" charset="0"/>
               </a:rPr>
-              <a:t>inprocessing</a:t>
+              <a:t>in-estimator mitigation</a:t>
             </a:r>
           </a:p>
         </p:txBody>
@@ -4715,7 +4715,7 @@
                 </a:solidFill>
                 <a:latin typeface="Times New Roman" panose="02020603050405020304" pitchFamily="18" charset="0"/>
               </a:rPr>
-              <a:t>postprocessing</a:t>
+              <a:t>post-estimator mitigation</a:t>
             </a:r>
           </a:p>
         </p:txBody>

</xml_diff>

<commit_message>
Added redact option to mitigators and changed "processing" terminology to "estimator". (#603)
</commit_message>
<xml_diff>
--- a/talks/fairness_patterns.pptx
+++ b/talks/fairness_patterns.pptx
@@ -259,7 +259,7 @@
           <a:p>
             <a:fld id="{9DC5AB9B-0FFF-401A-9D33-706977E99E8B}" type="datetimeFigureOut">
               <a:rPr lang="en-US" smtClean="0"/>
-              <a:t>12/29/2020</a:t>
+              <a:t>2/8/2021</a:t>
             </a:fld>
             <a:endParaRPr lang="en-US"/>
           </a:p>
@@ -457,7 +457,7 @@
           <a:p>
             <a:fld id="{9DC5AB9B-0FFF-401A-9D33-706977E99E8B}" type="datetimeFigureOut">
               <a:rPr lang="en-US" smtClean="0"/>
-              <a:t>12/29/2020</a:t>
+              <a:t>2/8/2021</a:t>
             </a:fld>
             <a:endParaRPr lang="en-US"/>
           </a:p>
@@ -665,7 +665,7 @@
           <a:p>
             <a:fld id="{9DC5AB9B-0FFF-401A-9D33-706977E99E8B}" type="datetimeFigureOut">
               <a:rPr lang="en-US" smtClean="0"/>
-              <a:t>12/29/2020</a:t>
+              <a:t>2/8/2021</a:t>
             </a:fld>
             <a:endParaRPr lang="en-US"/>
           </a:p>
@@ -863,7 +863,7 @@
           <a:p>
             <a:fld id="{9DC5AB9B-0FFF-401A-9D33-706977E99E8B}" type="datetimeFigureOut">
               <a:rPr lang="en-US" smtClean="0"/>
-              <a:t>12/29/2020</a:t>
+              <a:t>2/8/2021</a:t>
             </a:fld>
             <a:endParaRPr lang="en-US"/>
           </a:p>
@@ -1138,7 +1138,7 @@
           <a:p>
             <a:fld id="{9DC5AB9B-0FFF-401A-9D33-706977E99E8B}" type="datetimeFigureOut">
               <a:rPr lang="en-US" smtClean="0"/>
-              <a:t>12/29/2020</a:t>
+              <a:t>2/8/2021</a:t>
             </a:fld>
             <a:endParaRPr lang="en-US"/>
           </a:p>
@@ -1403,7 +1403,7 @@
           <a:p>
             <a:fld id="{9DC5AB9B-0FFF-401A-9D33-706977E99E8B}" type="datetimeFigureOut">
               <a:rPr lang="en-US" smtClean="0"/>
-              <a:t>12/29/2020</a:t>
+              <a:t>2/8/2021</a:t>
             </a:fld>
             <a:endParaRPr lang="en-US"/>
           </a:p>
@@ -1815,7 +1815,7 @@
           <a:p>
             <a:fld id="{9DC5AB9B-0FFF-401A-9D33-706977E99E8B}" type="datetimeFigureOut">
               <a:rPr lang="en-US" smtClean="0"/>
-              <a:t>12/29/2020</a:t>
+              <a:t>2/8/2021</a:t>
             </a:fld>
             <a:endParaRPr lang="en-US"/>
           </a:p>
@@ -1956,7 +1956,7 @@
           <a:p>
             <a:fld id="{9DC5AB9B-0FFF-401A-9D33-706977E99E8B}" type="datetimeFigureOut">
               <a:rPr lang="en-US" smtClean="0"/>
-              <a:t>12/29/2020</a:t>
+              <a:t>2/8/2021</a:t>
             </a:fld>
             <a:endParaRPr lang="en-US"/>
           </a:p>
@@ -2069,7 +2069,7 @@
           <a:p>
             <a:fld id="{9DC5AB9B-0FFF-401A-9D33-706977E99E8B}" type="datetimeFigureOut">
               <a:rPr lang="en-US" smtClean="0"/>
-              <a:t>12/29/2020</a:t>
+              <a:t>2/8/2021</a:t>
             </a:fld>
             <a:endParaRPr lang="en-US"/>
           </a:p>
@@ -2380,7 +2380,7 @@
           <a:p>
             <a:fld id="{9DC5AB9B-0FFF-401A-9D33-706977E99E8B}" type="datetimeFigureOut">
               <a:rPr lang="en-US" smtClean="0"/>
-              <a:t>12/29/2020</a:t>
+              <a:t>2/8/2021</a:t>
             </a:fld>
             <a:endParaRPr lang="en-US"/>
           </a:p>
@@ -2668,7 +2668,7 @@
           <a:p>
             <a:fld id="{9DC5AB9B-0FFF-401A-9D33-706977E99E8B}" type="datetimeFigureOut">
               <a:rPr lang="en-US" smtClean="0"/>
-              <a:t>12/29/2020</a:t>
+              <a:t>2/8/2021</a:t>
             </a:fld>
             <a:endParaRPr lang="en-US"/>
           </a:p>
@@ -2909,7 +2909,7 @@
           <a:p>
             <a:fld id="{9DC5AB9B-0FFF-401A-9D33-706977E99E8B}" type="datetimeFigureOut">
               <a:rPr lang="en-US" smtClean="0"/>
-              <a:t>12/29/2020</a:t>
+              <a:t>2/8/2021</a:t>
             </a:fld>
             <a:endParaRPr lang="en-US"/>
           </a:p>
@@ -3685,7 +3685,7 @@
                 </a:solidFill>
                 <a:latin typeface="Times New Roman" panose="02020603050405020304" pitchFamily="18" charset="0"/>
               </a:rPr>
-              <a:t>preprocessing</a:t>
+              <a:t>pre-estimator mitigation</a:t>
             </a:r>
           </a:p>
         </p:txBody>
@@ -4290,7 +4290,7 @@
                 </a:solidFill>
                 <a:latin typeface="Times New Roman" panose="02020603050405020304" pitchFamily="18" charset="0"/>
               </a:rPr>
-              <a:t>inprocessing</a:t>
+              <a:t>in-estimator mitigation</a:t>
             </a:r>
           </a:p>
         </p:txBody>
@@ -4715,7 +4715,7 @@
                 </a:solidFill>
                 <a:latin typeface="Times New Roman" panose="02020603050405020304" pitchFamily="18" charset="0"/>
               </a:rPr>
-              <a:t>postprocessing</a:t>
+              <a:t>post-estimator mitigation</a:t>
             </a:r>
           </a:p>
         </p:txBody>

</xml_diff>

<commit_message>
Changed random_state default to None in fair_stratified_train_test_split. Renamed preprocessing to preparation in fairness code to avoid collision with AIF360 terminology.
</commit_message>
<xml_diff>
--- a/talks/fairness_patterns.pptx
+++ b/talks/fairness_patterns.pptx
@@ -259,7 +259,7 @@
           <a:p>
             <a:fld id="{9DC5AB9B-0FFF-401A-9D33-706977E99E8B}" type="datetimeFigureOut">
               <a:rPr lang="en-US" smtClean="0"/>
-              <a:t>2/8/2021</a:t>
+              <a:t>2/26/2021</a:t>
             </a:fld>
             <a:endParaRPr lang="en-US"/>
           </a:p>
@@ -457,7 +457,7 @@
           <a:p>
             <a:fld id="{9DC5AB9B-0FFF-401A-9D33-706977E99E8B}" type="datetimeFigureOut">
               <a:rPr lang="en-US" smtClean="0"/>
-              <a:t>2/8/2021</a:t>
+              <a:t>2/26/2021</a:t>
             </a:fld>
             <a:endParaRPr lang="en-US"/>
           </a:p>
@@ -665,7 +665,7 @@
           <a:p>
             <a:fld id="{9DC5AB9B-0FFF-401A-9D33-706977E99E8B}" type="datetimeFigureOut">
               <a:rPr lang="en-US" smtClean="0"/>
-              <a:t>2/8/2021</a:t>
+              <a:t>2/26/2021</a:t>
             </a:fld>
             <a:endParaRPr lang="en-US"/>
           </a:p>
@@ -863,7 +863,7 @@
           <a:p>
             <a:fld id="{9DC5AB9B-0FFF-401A-9D33-706977E99E8B}" type="datetimeFigureOut">
               <a:rPr lang="en-US" smtClean="0"/>
-              <a:t>2/8/2021</a:t>
+              <a:t>2/26/2021</a:t>
             </a:fld>
             <a:endParaRPr lang="en-US"/>
           </a:p>
@@ -1138,7 +1138,7 @@
           <a:p>
             <a:fld id="{9DC5AB9B-0FFF-401A-9D33-706977E99E8B}" type="datetimeFigureOut">
               <a:rPr lang="en-US" smtClean="0"/>
-              <a:t>2/8/2021</a:t>
+              <a:t>2/26/2021</a:t>
             </a:fld>
             <a:endParaRPr lang="en-US"/>
           </a:p>
@@ -1403,7 +1403,7 @@
           <a:p>
             <a:fld id="{9DC5AB9B-0FFF-401A-9D33-706977E99E8B}" type="datetimeFigureOut">
               <a:rPr lang="en-US" smtClean="0"/>
-              <a:t>2/8/2021</a:t>
+              <a:t>2/26/2021</a:t>
             </a:fld>
             <a:endParaRPr lang="en-US"/>
           </a:p>
@@ -1815,7 +1815,7 @@
           <a:p>
             <a:fld id="{9DC5AB9B-0FFF-401A-9D33-706977E99E8B}" type="datetimeFigureOut">
               <a:rPr lang="en-US" smtClean="0"/>
-              <a:t>2/8/2021</a:t>
+              <a:t>2/26/2021</a:t>
             </a:fld>
             <a:endParaRPr lang="en-US"/>
           </a:p>
@@ -1956,7 +1956,7 @@
           <a:p>
             <a:fld id="{9DC5AB9B-0FFF-401A-9D33-706977E99E8B}" type="datetimeFigureOut">
               <a:rPr lang="en-US" smtClean="0"/>
-              <a:t>2/8/2021</a:t>
+              <a:t>2/26/2021</a:t>
             </a:fld>
             <a:endParaRPr lang="en-US"/>
           </a:p>
@@ -2069,7 +2069,7 @@
           <a:p>
             <a:fld id="{9DC5AB9B-0FFF-401A-9D33-706977E99E8B}" type="datetimeFigureOut">
               <a:rPr lang="en-US" smtClean="0"/>
-              <a:t>2/8/2021</a:t>
+              <a:t>2/26/2021</a:t>
             </a:fld>
             <a:endParaRPr lang="en-US"/>
           </a:p>
@@ -2380,7 +2380,7 @@
           <a:p>
             <a:fld id="{9DC5AB9B-0FFF-401A-9D33-706977E99E8B}" type="datetimeFigureOut">
               <a:rPr lang="en-US" smtClean="0"/>
-              <a:t>2/8/2021</a:t>
+              <a:t>2/26/2021</a:t>
             </a:fld>
             <a:endParaRPr lang="en-US"/>
           </a:p>
@@ -2668,7 +2668,7 @@
           <a:p>
             <a:fld id="{9DC5AB9B-0FFF-401A-9D33-706977E99E8B}" type="datetimeFigureOut">
               <a:rPr lang="en-US" smtClean="0"/>
-              <a:t>2/8/2021</a:t>
+              <a:t>2/26/2021</a:t>
             </a:fld>
             <a:endParaRPr lang="en-US"/>
           </a:p>
@@ -2909,7 +2909,7 @@
           <a:p>
             <a:fld id="{9DC5AB9B-0FFF-401A-9D33-706977E99E8B}" type="datetimeFigureOut">
               <a:rPr lang="en-US" smtClean="0"/>
-              <a:t>2/8/2021</a:t>
+              <a:t>2/26/2021</a:t>
             </a:fld>
             <a:endParaRPr lang="en-US"/>
           </a:p>
@@ -3443,7 +3443,7 @@
                 </a:solidFill>
                 <a:latin typeface="Times New Roman" panose="02020603050405020304" pitchFamily="18" charset="0"/>
               </a:rPr>
-              <a:t>prepro-cessing</a:t>
+              <a:t>prep-aration</a:t>
             </a:r>
           </a:p>
         </p:txBody>
@@ -3522,8 +3522,8 @@
         </p:nvSpPr>
         <p:spPr>
           <a:xfrm>
-            <a:off x="6394249" y="1095415"/>
-            <a:ext cx="914400" cy="548640"/>
+            <a:off x="6278545" y="1095414"/>
+            <a:ext cx="1141173" cy="548640"/>
           </a:xfrm>
           <a:prstGeom prst="ellipse">
             <a:avLst/>
@@ -3565,6 +3565,23 @@
                 </a:solidFill>
                 <a:latin typeface="Times New Roman" panose="02020603050405020304" pitchFamily="18" charset="0"/>
               </a:rPr>
+              <a:t>pre-estimator</a:t>
+            </a:r>
+            <a:br>
+              <a:rPr lang="en-US" sz="1400" i="1">
+                <a:solidFill>
+                  <a:schemeClr val="tx1"/>
+                </a:solidFill>
+                <a:latin typeface="Times New Roman" panose="02020603050405020304" pitchFamily="18" charset="0"/>
+              </a:rPr>
+            </a:br>
+            <a:r>
+              <a:rPr lang="en-US" sz="1400" i="1">
+                <a:solidFill>
+                  <a:schemeClr val="tx1"/>
+                </a:solidFill>
+                <a:latin typeface="Times New Roman" panose="02020603050405020304" pitchFamily="18" charset="0"/>
+              </a:rPr>
               <a:t>mitigator</a:t>
             </a:r>
           </a:p>
@@ -3754,7 +3771,7 @@
         <p:spPr>
           <a:xfrm>
             <a:off x="5949173" y="1132274"/>
-            <a:ext cx="445076" cy="237461"/>
+            <a:ext cx="329372" cy="237460"/>
           </a:xfrm>
           <a:prstGeom prst="straightConnector1">
             <a:avLst/>
@@ -3799,8 +3816,8 @@
         </p:nvCxnSpPr>
         <p:spPr>
           <a:xfrm flipV="1">
-            <a:off x="5949173" y="1369735"/>
-            <a:ext cx="445076" cy="485470"/>
+            <a:off x="5949173" y="1369734"/>
+            <a:ext cx="329372" cy="485471"/>
           </a:xfrm>
           <a:prstGeom prst="straightConnector1">
             <a:avLst/>
@@ -3845,8 +3862,8 @@
         </p:nvCxnSpPr>
         <p:spPr>
           <a:xfrm>
-            <a:off x="7308649" y="1369735"/>
-            <a:ext cx="445076" cy="0"/>
+            <a:off x="7419718" y="1369734"/>
+            <a:ext cx="334007" cy="1"/>
           </a:xfrm>
           <a:prstGeom prst="straightConnector1">
             <a:avLst/>
@@ -4036,7 +4053,7 @@
                 </a:solidFill>
                 <a:latin typeface="Times New Roman" panose="02020603050405020304" pitchFamily="18" charset="0"/>
               </a:rPr>
-              <a:t>prepro-cessing</a:t>
+              <a:t>prep-aration</a:t>
             </a:r>
           </a:p>
         </p:txBody>
@@ -4115,8 +4132,8 @@
         </p:nvSpPr>
         <p:spPr>
           <a:xfrm>
-            <a:off x="6394249" y="3069746"/>
-            <a:ext cx="914400" cy="548640"/>
+            <a:off x="6278544" y="3069746"/>
+            <a:ext cx="1141173" cy="548640"/>
           </a:xfrm>
           <a:prstGeom prst="ellipse">
             <a:avLst/>
@@ -4160,17 +4177,22 @@
               </a:rPr>
               <a:t>mitigator</a:t>
             </a:r>
-          </a:p>
-          <a:p>
-            <a:pPr algn="ctr"/>
-            <a:r>
+            <a:br>
               <a:rPr lang="en-US" sz="1400" i="1">
                 <a:solidFill>
                   <a:schemeClr val="tx1"/>
                 </a:solidFill>
                 <a:latin typeface="Times New Roman" panose="02020603050405020304" pitchFamily="18" charset="0"/>
               </a:rPr>
-              <a:t>incl. est.</a:t>
+            </a:br>
+            <a:r>
+              <a:rPr lang="en-US" sz="1400" i="1">
+                <a:solidFill>
+                  <a:schemeClr val="tx1"/>
+                </a:solidFill>
+                <a:latin typeface="Times New Roman" panose="02020603050405020304" pitchFamily="18" charset="0"/>
+              </a:rPr>
+              <a:t>incl. estim.</a:t>
             </a:r>
           </a:p>
         </p:txBody>
@@ -4359,7 +4381,7 @@
         <p:spPr>
           <a:xfrm>
             <a:off x="5949173" y="3106605"/>
-            <a:ext cx="445076" cy="237461"/>
+            <a:ext cx="329371" cy="237461"/>
           </a:xfrm>
           <a:prstGeom prst="straightConnector1">
             <a:avLst/>
@@ -4405,7 +4427,7 @@
         <p:spPr>
           <a:xfrm flipV="1">
             <a:off x="5949173" y="3344066"/>
-            <a:ext cx="445076" cy="485470"/>
+            <a:ext cx="329371" cy="485470"/>
           </a:xfrm>
           <a:prstGeom prst="straightConnector1">
             <a:avLst/>
@@ -4450,8 +4472,8 @@
         </p:nvCxnSpPr>
         <p:spPr>
           <a:xfrm>
-            <a:off x="7308649" y="3344066"/>
-            <a:ext cx="445076" cy="0"/>
+            <a:off x="7419717" y="3344066"/>
+            <a:ext cx="334008" cy="0"/>
           </a:xfrm>
           <a:prstGeom prst="straightConnector1">
             <a:avLst/>
@@ -4784,7 +4806,7 @@
         <p:spPr>
           <a:xfrm>
             <a:off x="5949173" y="5080936"/>
-            <a:ext cx="445076" cy="237461"/>
+            <a:ext cx="329371" cy="237461"/>
           </a:xfrm>
           <a:prstGeom prst="straightConnector1">
             <a:avLst/>
@@ -4830,7 +4852,7 @@
         <p:spPr>
           <a:xfrm flipV="1">
             <a:off x="5949173" y="5318397"/>
-            <a:ext cx="445076" cy="485470"/>
+            <a:ext cx="329371" cy="485470"/>
           </a:xfrm>
           <a:prstGeom prst="straightConnector1">
             <a:avLst/>
@@ -4871,8 +4893,8 @@
         </p:nvSpPr>
         <p:spPr>
           <a:xfrm>
-            <a:off x="6394249" y="5044077"/>
-            <a:ext cx="914400" cy="548640"/>
+            <a:off x="6278544" y="5044077"/>
+            <a:ext cx="1141173" cy="548640"/>
           </a:xfrm>
           <a:prstGeom prst="ellipse">
             <a:avLst/>
@@ -4914,6 +4936,23 @@
                 </a:solidFill>
                 <a:latin typeface="Times New Roman" panose="02020603050405020304" pitchFamily="18" charset="0"/>
               </a:rPr>
+              <a:t>post-estimator</a:t>
+            </a:r>
+            <a:br>
+              <a:rPr lang="en-US" sz="1400" i="1">
+                <a:solidFill>
+                  <a:schemeClr val="tx1"/>
+                </a:solidFill>
+                <a:latin typeface="Times New Roman" panose="02020603050405020304" pitchFamily="18" charset="0"/>
+              </a:rPr>
+            </a:br>
+            <a:r>
+              <a:rPr lang="en-US" sz="1400" i="1">
+                <a:solidFill>
+                  <a:schemeClr val="tx1"/>
+                </a:solidFill>
+                <a:latin typeface="Times New Roman" panose="02020603050405020304" pitchFamily="18" charset="0"/>
+              </a:rPr>
               <a:t>mitigator</a:t>
             </a:r>
           </a:p>
@@ -4997,8 +5036,8 @@
         </p:nvCxnSpPr>
         <p:spPr>
           <a:xfrm>
-            <a:off x="7308649" y="5318397"/>
-            <a:ext cx="445076" cy="0"/>
+            <a:off x="7419717" y="5318397"/>
+            <a:ext cx="334008" cy="0"/>
           </a:xfrm>
           <a:prstGeom prst="straightConnector1">
             <a:avLst/>

</xml_diff>

<commit_message>
Changed random_state default to None in fair_stratified_train_test_split. Renamed preprocessing to preparation in fairness code to avoid collision with AIF360 terminology. (#615)
</commit_message>
<xml_diff>
--- a/talks/fairness_patterns.pptx
+++ b/talks/fairness_patterns.pptx
@@ -259,7 +259,7 @@
           <a:p>
             <a:fld id="{9DC5AB9B-0FFF-401A-9D33-706977E99E8B}" type="datetimeFigureOut">
               <a:rPr lang="en-US" smtClean="0"/>
-              <a:t>2/8/2021</a:t>
+              <a:t>2/26/2021</a:t>
             </a:fld>
             <a:endParaRPr lang="en-US"/>
           </a:p>
@@ -457,7 +457,7 @@
           <a:p>
             <a:fld id="{9DC5AB9B-0FFF-401A-9D33-706977E99E8B}" type="datetimeFigureOut">
               <a:rPr lang="en-US" smtClean="0"/>
-              <a:t>2/8/2021</a:t>
+              <a:t>2/26/2021</a:t>
             </a:fld>
             <a:endParaRPr lang="en-US"/>
           </a:p>
@@ -665,7 +665,7 @@
           <a:p>
             <a:fld id="{9DC5AB9B-0FFF-401A-9D33-706977E99E8B}" type="datetimeFigureOut">
               <a:rPr lang="en-US" smtClean="0"/>
-              <a:t>2/8/2021</a:t>
+              <a:t>2/26/2021</a:t>
             </a:fld>
             <a:endParaRPr lang="en-US"/>
           </a:p>
@@ -863,7 +863,7 @@
           <a:p>
             <a:fld id="{9DC5AB9B-0FFF-401A-9D33-706977E99E8B}" type="datetimeFigureOut">
               <a:rPr lang="en-US" smtClean="0"/>
-              <a:t>2/8/2021</a:t>
+              <a:t>2/26/2021</a:t>
             </a:fld>
             <a:endParaRPr lang="en-US"/>
           </a:p>
@@ -1138,7 +1138,7 @@
           <a:p>
             <a:fld id="{9DC5AB9B-0FFF-401A-9D33-706977E99E8B}" type="datetimeFigureOut">
               <a:rPr lang="en-US" smtClean="0"/>
-              <a:t>2/8/2021</a:t>
+              <a:t>2/26/2021</a:t>
             </a:fld>
             <a:endParaRPr lang="en-US"/>
           </a:p>
@@ -1403,7 +1403,7 @@
           <a:p>
             <a:fld id="{9DC5AB9B-0FFF-401A-9D33-706977E99E8B}" type="datetimeFigureOut">
               <a:rPr lang="en-US" smtClean="0"/>
-              <a:t>2/8/2021</a:t>
+              <a:t>2/26/2021</a:t>
             </a:fld>
             <a:endParaRPr lang="en-US"/>
           </a:p>
@@ -1815,7 +1815,7 @@
           <a:p>
             <a:fld id="{9DC5AB9B-0FFF-401A-9D33-706977E99E8B}" type="datetimeFigureOut">
               <a:rPr lang="en-US" smtClean="0"/>
-              <a:t>2/8/2021</a:t>
+              <a:t>2/26/2021</a:t>
             </a:fld>
             <a:endParaRPr lang="en-US"/>
           </a:p>
@@ -1956,7 +1956,7 @@
           <a:p>
             <a:fld id="{9DC5AB9B-0FFF-401A-9D33-706977E99E8B}" type="datetimeFigureOut">
               <a:rPr lang="en-US" smtClean="0"/>
-              <a:t>2/8/2021</a:t>
+              <a:t>2/26/2021</a:t>
             </a:fld>
             <a:endParaRPr lang="en-US"/>
           </a:p>
@@ -2069,7 +2069,7 @@
           <a:p>
             <a:fld id="{9DC5AB9B-0FFF-401A-9D33-706977E99E8B}" type="datetimeFigureOut">
               <a:rPr lang="en-US" smtClean="0"/>
-              <a:t>2/8/2021</a:t>
+              <a:t>2/26/2021</a:t>
             </a:fld>
             <a:endParaRPr lang="en-US"/>
           </a:p>
@@ -2380,7 +2380,7 @@
           <a:p>
             <a:fld id="{9DC5AB9B-0FFF-401A-9D33-706977E99E8B}" type="datetimeFigureOut">
               <a:rPr lang="en-US" smtClean="0"/>
-              <a:t>2/8/2021</a:t>
+              <a:t>2/26/2021</a:t>
             </a:fld>
             <a:endParaRPr lang="en-US"/>
           </a:p>
@@ -2668,7 +2668,7 @@
           <a:p>
             <a:fld id="{9DC5AB9B-0FFF-401A-9D33-706977E99E8B}" type="datetimeFigureOut">
               <a:rPr lang="en-US" smtClean="0"/>
-              <a:t>2/8/2021</a:t>
+              <a:t>2/26/2021</a:t>
             </a:fld>
             <a:endParaRPr lang="en-US"/>
           </a:p>
@@ -2909,7 +2909,7 @@
           <a:p>
             <a:fld id="{9DC5AB9B-0FFF-401A-9D33-706977E99E8B}" type="datetimeFigureOut">
               <a:rPr lang="en-US" smtClean="0"/>
-              <a:t>2/8/2021</a:t>
+              <a:t>2/26/2021</a:t>
             </a:fld>
             <a:endParaRPr lang="en-US"/>
           </a:p>
@@ -3443,7 +3443,7 @@
                 </a:solidFill>
                 <a:latin typeface="Times New Roman" panose="02020603050405020304" pitchFamily="18" charset="0"/>
               </a:rPr>
-              <a:t>prepro-cessing</a:t>
+              <a:t>prep-aration</a:t>
             </a:r>
           </a:p>
         </p:txBody>
@@ -3522,8 +3522,8 @@
         </p:nvSpPr>
         <p:spPr>
           <a:xfrm>
-            <a:off x="6394249" y="1095415"/>
-            <a:ext cx="914400" cy="548640"/>
+            <a:off x="6278545" y="1095414"/>
+            <a:ext cx="1141173" cy="548640"/>
           </a:xfrm>
           <a:prstGeom prst="ellipse">
             <a:avLst/>
@@ -3565,6 +3565,23 @@
                 </a:solidFill>
                 <a:latin typeface="Times New Roman" panose="02020603050405020304" pitchFamily="18" charset="0"/>
               </a:rPr>
+              <a:t>pre-estimator</a:t>
+            </a:r>
+            <a:br>
+              <a:rPr lang="en-US" sz="1400" i="1">
+                <a:solidFill>
+                  <a:schemeClr val="tx1"/>
+                </a:solidFill>
+                <a:latin typeface="Times New Roman" panose="02020603050405020304" pitchFamily="18" charset="0"/>
+              </a:rPr>
+            </a:br>
+            <a:r>
+              <a:rPr lang="en-US" sz="1400" i="1">
+                <a:solidFill>
+                  <a:schemeClr val="tx1"/>
+                </a:solidFill>
+                <a:latin typeface="Times New Roman" panose="02020603050405020304" pitchFamily="18" charset="0"/>
+              </a:rPr>
               <a:t>mitigator</a:t>
             </a:r>
           </a:p>
@@ -3754,7 +3771,7 @@
         <p:spPr>
           <a:xfrm>
             <a:off x="5949173" y="1132274"/>
-            <a:ext cx="445076" cy="237461"/>
+            <a:ext cx="329372" cy="237460"/>
           </a:xfrm>
           <a:prstGeom prst="straightConnector1">
             <a:avLst/>
@@ -3799,8 +3816,8 @@
         </p:nvCxnSpPr>
         <p:spPr>
           <a:xfrm flipV="1">
-            <a:off x="5949173" y="1369735"/>
-            <a:ext cx="445076" cy="485470"/>
+            <a:off x="5949173" y="1369734"/>
+            <a:ext cx="329372" cy="485471"/>
           </a:xfrm>
           <a:prstGeom prst="straightConnector1">
             <a:avLst/>
@@ -3845,8 +3862,8 @@
         </p:nvCxnSpPr>
         <p:spPr>
           <a:xfrm>
-            <a:off x="7308649" y="1369735"/>
-            <a:ext cx="445076" cy="0"/>
+            <a:off x="7419718" y="1369734"/>
+            <a:ext cx="334007" cy="1"/>
           </a:xfrm>
           <a:prstGeom prst="straightConnector1">
             <a:avLst/>
@@ -4036,7 +4053,7 @@
                 </a:solidFill>
                 <a:latin typeface="Times New Roman" panose="02020603050405020304" pitchFamily="18" charset="0"/>
               </a:rPr>
-              <a:t>prepro-cessing</a:t>
+              <a:t>prep-aration</a:t>
             </a:r>
           </a:p>
         </p:txBody>
@@ -4115,8 +4132,8 @@
         </p:nvSpPr>
         <p:spPr>
           <a:xfrm>
-            <a:off x="6394249" y="3069746"/>
-            <a:ext cx="914400" cy="548640"/>
+            <a:off x="6278544" y="3069746"/>
+            <a:ext cx="1141173" cy="548640"/>
           </a:xfrm>
           <a:prstGeom prst="ellipse">
             <a:avLst/>
@@ -4160,17 +4177,22 @@
               </a:rPr>
               <a:t>mitigator</a:t>
             </a:r>
-          </a:p>
-          <a:p>
-            <a:pPr algn="ctr"/>
-            <a:r>
+            <a:br>
               <a:rPr lang="en-US" sz="1400" i="1">
                 <a:solidFill>
                   <a:schemeClr val="tx1"/>
                 </a:solidFill>
                 <a:latin typeface="Times New Roman" panose="02020603050405020304" pitchFamily="18" charset="0"/>
               </a:rPr>
-              <a:t>incl. est.</a:t>
+            </a:br>
+            <a:r>
+              <a:rPr lang="en-US" sz="1400" i="1">
+                <a:solidFill>
+                  <a:schemeClr val="tx1"/>
+                </a:solidFill>
+                <a:latin typeface="Times New Roman" panose="02020603050405020304" pitchFamily="18" charset="0"/>
+              </a:rPr>
+              <a:t>incl. estim.</a:t>
             </a:r>
           </a:p>
         </p:txBody>
@@ -4359,7 +4381,7 @@
         <p:spPr>
           <a:xfrm>
             <a:off x="5949173" y="3106605"/>
-            <a:ext cx="445076" cy="237461"/>
+            <a:ext cx="329371" cy="237461"/>
           </a:xfrm>
           <a:prstGeom prst="straightConnector1">
             <a:avLst/>
@@ -4405,7 +4427,7 @@
         <p:spPr>
           <a:xfrm flipV="1">
             <a:off x="5949173" y="3344066"/>
-            <a:ext cx="445076" cy="485470"/>
+            <a:ext cx="329371" cy="485470"/>
           </a:xfrm>
           <a:prstGeom prst="straightConnector1">
             <a:avLst/>
@@ -4450,8 +4472,8 @@
         </p:nvCxnSpPr>
         <p:spPr>
           <a:xfrm>
-            <a:off x="7308649" y="3344066"/>
-            <a:ext cx="445076" cy="0"/>
+            <a:off x="7419717" y="3344066"/>
+            <a:ext cx="334008" cy="0"/>
           </a:xfrm>
           <a:prstGeom prst="straightConnector1">
             <a:avLst/>
@@ -4784,7 +4806,7 @@
         <p:spPr>
           <a:xfrm>
             <a:off x="5949173" y="5080936"/>
-            <a:ext cx="445076" cy="237461"/>
+            <a:ext cx="329371" cy="237461"/>
           </a:xfrm>
           <a:prstGeom prst="straightConnector1">
             <a:avLst/>
@@ -4830,7 +4852,7 @@
         <p:spPr>
           <a:xfrm flipV="1">
             <a:off x="5949173" y="5318397"/>
-            <a:ext cx="445076" cy="485470"/>
+            <a:ext cx="329371" cy="485470"/>
           </a:xfrm>
           <a:prstGeom prst="straightConnector1">
             <a:avLst/>
@@ -4871,8 +4893,8 @@
         </p:nvSpPr>
         <p:spPr>
           <a:xfrm>
-            <a:off x="6394249" y="5044077"/>
-            <a:ext cx="914400" cy="548640"/>
+            <a:off x="6278544" y="5044077"/>
+            <a:ext cx="1141173" cy="548640"/>
           </a:xfrm>
           <a:prstGeom prst="ellipse">
             <a:avLst/>
@@ -4914,6 +4936,23 @@
                 </a:solidFill>
                 <a:latin typeface="Times New Roman" panose="02020603050405020304" pitchFamily="18" charset="0"/>
               </a:rPr>
+              <a:t>post-estimator</a:t>
+            </a:r>
+            <a:br>
+              <a:rPr lang="en-US" sz="1400" i="1">
+                <a:solidFill>
+                  <a:schemeClr val="tx1"/>
+                </a:solidFill>
+                <a:latin typeface="Times New Roman" panose="02020603050405020304" pitchFamily="18" charset="0"/>
+              </a:rPr>
+            </a:br>
+            <a:r>
+              <a:rPr lang="en-US" sz="1400" i="1">
+                <a:solidFill>
+                  <a:schemeClr val="tx1"/>
+                </a:solidFill>
+                <a:latin typeface="Times New Roman" panose="02020603050405020304" pitchFamily="18" charset="0"/>
+              </a:rPr>
               <a:t>mitigator</a:t>
             </a:r>
           </a:p>
@@ -4997,8 +5036,8 @@
         </p:nvCxnSpPr>
         <p:spPr>
           <a:xfrm>
-            <a:off x="7308649" y="5318397"/>
-            <a:ext cx="445076" cy="0"/>
+            <a:off x="7419717" y="5318397"/>
+            <a:ext cx="334008" cy="0"/>
           </a:xfrm>
           <a:prstGeom prst="straightConnector1">
             <a:avLst/>

</xml_diff>